<commit_message>
specified the tiers of EC2 instances and RDSs
</commit_message>
<xml_diff>
--- a/project2-design-provision-and-monitor-aws-infra-at-scale/task1-create-aws-architecture-schematics/Udacity_Diagram_1.pptx
+++ b/project2-design-provision-and-monitor-aws-infra-at-scale/task1-create-aws-architecture-schematics/Udacity_Diagram_1.pptx
@@ -259,7 +259,7 @@
           <a:p>
             <a:fld id="{308D30CC-8BF5-E04B-B204-4EA17661A6B6}" type="datetimeFigureOut">
               <a:rPr kumimoji="1" lang="ko-KR" altLang="en-US" smtClean="0"/>
-              <a:t>2020. 12. 16.</a:t>
+              <a:t>2020. 12. 17.</a:t>
             </a:fld>
             <a:endParaRPr kumimoji="1" lang="ko-KR" altLang="en-US"/>
           </a:p>
@@ -432,7 +432,7 @@
           <a:p>
             <a:fld id="{308D30CC-8BF5-E04B-B204-4EA17661A6B6}" type="datetimeFigureOut">
               <a:rPr kumimoji="1" lang="ko-KR" altLang="en-US" smtClean="0"/>
-              <a:t>2020. 12. 16.</a:t>
+              <a:t>2020. 12. 17.</a:t>
             </a:fld>
             <a:endParaRPr kumimoji="1" lang="ko-KR" altLang="en-US"/>
           </a:p>
@@ -615,7 +615,7 @@
           <a:p>
             <a:fld id="{308D30CC-8BF5-E04B-B204-4EA17661A6B6}" type="datetimeFigureOut">
               <a:rPr kumimoji="1" lang="ko-KR" altLang="en-US" smtClean="0"/>
-              <a:t>2020. 12. 16.</a:t>
+              <a:t>2020. 12. 17.</a:t>
             </a:fld>
             <a:endParaRPr kumimoji="1" lang="ko-KR" altLang="en-US"/>
           </a:p>
@@ -788,7 +788,7 @@
           <a:p>
             <a:fld id="{308D30CC-8BF5-E04B-B204-4EA17661A6B6}" type="datetimeFigureOut">
               <a:rPr kumimoji="1" lang="ko-KR" altLang="en-US" smtClean="0"/>
-              <a:t>2020. 12. 16.</a:t>
+              <a:t>2020. 12. 17.</a:t>
             </a:fld>
             <a:endParaRPr kumimoji="1" lang="ko-KR" altLang="en-US"/>
           </a:p>
@@ -1066,7 +1066,7 @@
           <a:p>
             <a:fld id="{308D30CC-8BF5-E04B-B204-4EA17661A6B6}" type="datetimeFigureOut">
               <a:rPr kumimoji="1" lang="ko-KR" altLang="en-US" smtClean="0"/>
-              <a:t>2020. 12. 16.</a:t>
+              <a:t>2020. 12. 17.</a:t>
             </a:fld>
             <a:endParaRPr kumimoji="1" lang="ko-KR" altLang="en-US"/>
           </a:p>
@@ -1281,7 +1281,7 @@
           <a:p>
             <a:fld id="{308D30CC-8BF5-E04B-B204-4EA17661A6B6}" type="datetimeFigureOut">
               <a:rPr kumimoji="1" lang="ko-KR" altLang="en-US" smtClean="0"/>
-              <a:t>2020. 12. 16.</a:t>
+              <a:t>2020. 12. 17.</a:t>
             </a:fld>
             <a:endParaRPr kumimoji="1" lang="ko-KR" altLang="en-US"/>
           </a:p>
@@ -1649,7 +1649,7 @@
           <a:p>
             <a:fld id="{308D30CC-8BF5-E04B-B204-4EA17661A6B6}" type="datetimeFigureOut">
               <a:rPr kumimoji="1" lang="ko-KR" altLang="en-US" smtClean="0"/>
-              <a:t>2020. 12. 16.</a:t>
+              <a:t>2020. 12. 17.</a:t>
             </a:fld>
             <a:endParaRPr kumimoji="1" lang="ko-KR" altLang="en-US"/>
           </a:p>
@@ -1790,7 +1790,7 @@
           <a:p>
             <a:fld id="{308D30CC-8BF5-E04B-B204-4EA17661A6B6}" type="datetimeFigureOut">
               <a:rPr kumimoji="1" lang="ko-KR" altLang="en-US" smtClean="0"/>
-              <a:t>2020. 12. 16.</a:t>
+              <a:t>2020. 12. 17.</a:t>
             </a:fld>
             <a:endParaRPr kumimoji="1" lang="ko-KR" altLang="en-US"/>
           </a:p>
@@ -1903,7 +1903,7 @@
           <a:p>
             <a:fld id="{308D30CC-8BF5-E04B-B204-4EA17661A6B6}" type="datetimeFigureOut">
               <a:rPr kumimoji="1" lang="ko-KR" altLang="en-US" smtClean="0"/>
-              <a:t>2020. 12. 16.</a:t>
+              <a:t>2020. 12. 17.</a:t>
             </a:fld>
             <a:endParaRPr kumimoji="1" lang="ko-KR" altLang="en-US"/>
           </a:p>
@@ -2192,7 +2192,7 @@
           <a:p>
             <a:fld id="{308D30CC-8BF5-E04B-B204-4EA17661A6B6}" type="datetimeFigureOut">
               <a:rPr kumimoji="1" lang="ko-KR" altLang="en-US" smtClean="0"/>
-              <a:t>2020. 12. 16.</a:t>
+              <a:t>2020. 12. 17.</a:t>
             </a:fld>
             <a:endParaRPr kumimoji="1" lang="ko-KR" altLang="en-US"/>
           </a:p>
@@ -2483,7 +2483,7 @@
           <a:p>
             <a:fld id="{308D30CC-8BF5-E04B-B204-4EA17661A6B6}" type="datetimeFigureOut">
               <a:rPr kumimoji="1" lang="ko-KR" altLang="en-US" smtClean="0"/>
-              <a:t>2020. 12. 16.</a:t>
+              <a:t>2020. 12. 17.</a:t>
             </a:fld>
             <a:endParaRPr kumimoji="1" lang="ko-KR" altLang="en-US"/>
           </a:p>
@@ -2699,7 +2699,7 @@
           <a:p>
             <a:fld id="{308D30CC-8BF5-E04B-B204-4EA17661A6B6}" type="datetimeFigureOut">
               <a:rPr kumimoji="1" lang="ko-KR" altLang="en-US" smtClean="0"/>
-              <a:t>2020. 12. 16.</a:t>
+              <a:t>2020. 12. 17.</a:t>
             </a:fld>
             <a:endParaRPr kumimoji="1" lang="ko-KR" altLang="en-US"/>
           </a:p>
@@ -4959,7 +4959,7 @@
           </p:blipFill>
           <p:spPr bwMode="auto">
             <a:xfrm>
-              <a:off x="6160823" y="2168289"/>
+              <a:off x="6160823" y="2129377"/>
               <a:ext cx="379412" cy="379413"/>
             </a:xfrm>
             <a:prstGeom prst="rect">
@@ -5006,8 +5006,8 @@
           </p:nvSpPr>
           <p:spPr bwMode="auto">
             <a:xfrm>
-              <a:off x="5636808" y="2528164"/>
-              <a:ext cx="1427827" cy="261610"/>
+              <a:off x="5636808" y="2489252"/>
+              <a:ext cx="1427827" cy="430887"/>
             </a:xfrm>
             <a:prstGeom prst="rect">
               <a:avLst/>
@@ -5139,7 +5139,7 @@
               </a:lvl9pPr>
             </a:lstStyle>
             <a:p>
-              <a:pPr algn="ctr" eaLnBrk="1" hangingPunct="1"/>
+              <a:pPr algn="ctr"/>
               <a:r>
                 <a:rPr lang="en-US" altLang="en-US" sz="1100" dirty="0">
                   <a:solidFill>
@@ -5148,6 +5148,38 @@
                 </a:rPr>
                 <a:t>Web Server</a:t>
               </a:r>
+              <a:br>
+                <a:rPr lang="en-US" altLang="en-US" sz="1100" dirty="0">
+                  <a:solidFill>
+                    <a:srgbClr val="232F3E"/>
+                  </a:solidFill>
+                </a:rPr>
+              </a:br>
+              <a:r>
+                <a:rPr lang="en-US" altLang="en-US" sz="1100" dirty="0">
+                  <a:solidFill>
+                    <a:srgbClr val="232F3E"/>
+                  </a:solidFill>
+                </a:rPr>
+                <a:t>(</a:t>
+              </a:r>
+              <a:r>
+                <a:rPr lang="en" altLang="ko-KR" sz="1100" dirty="0">
+                  <a:solidFill>
+                    <a:srgbClr val="232F3E"/>
+                  </a:solidFill>
+                </a:rPr>
+                <a:t>t3a</a:t>
+              </a:r>
+              <a:r>
+                <a:rPr lang="en" altLang="ko-KR" sz="1100" dirty="0"/>
+                <a:t>.2xlarge)</a:t>
+              </a:r>
+              <a:endParaRPr lang="en-US" altLang="en-US" sz="1100" dirty="0">
+                <a:solidFill>
+                  <a:srgbClr val="232F3E"/>
+                </a:solidFill>
+              </a:endParaRPr>
             </a:p>
           </p:txBody>
         </p:sp>
@@ -5399,8 +5431,8 @@
           </p:nvSpPr>
           <p:spPr bwMode="auto">
             <a:xfrm>
-              <a:off x="9483215" y="2495626"/>
-              <a:ext cx="1408563" cy="430887"/>
+              <a:off x="9473487" y="2369166"/>
+              <a:ext cx="1408563" cy="600164"/>
             </a:xfrm>
             <a:prstGeom prst="rect">
               <a:avLst/>
@@ -5552,6 +5584,16 @@
                   <a:cs typeface="Calibri" panose="020F0502020204030204" pitchFamily="34" charset="0"/>
                 </a:rPr>
                 <a:t>RDS Master</a:t>
+              </a:r>
+            </a:p>
+            <a:p>
+              <a:pPr algn="ctr"/>
+              <a:r>
+                <a:rPr lang="en-US" altLang="en-US" sz="1100" dirty="0">
+                  <a:ea typeface="Amazon Ember" panose="020B0603020204020204" pitchFamily="34" charset="0"/>
+                  <a:cs typeface="Calibri" panose="020F0502020204030204" pitchFamily="34" charset="0"/>
+                </a:rPr>
+                <a:t>(db.r5.4xlarge)</a:t>
               </a:r>
             </a:p>
           </p:txBody>
@@ -5585,7 +5627,7 @@
           </p:blipFill>
           <p:spPr bwMode="auto">
             <a:xfrm>
-              <a:off x="8640802" y="2117408"/>
+              <a:off x="8640802" y="2020129"/>
               <a:ext cx="379412" cy="379413"/>
             </a:xfrm>
             <a:prstGeom prst="rect">
@@ -5632,8 +5674,8 @@
           </p:nvSpPr>
           <p:spPr bwMode="auto">
             <a:xfrm>
-              <a:off x="8116787" y="2477283"/>
-              <a:ext cx="1427827" cy="261610"/>
+              <a:off x="8145970" y="2389734"/>
+              <a:ext cx="1427827" cy="430887"/>
             </a:xfrm>
             <a:prstGeom prst="rect">
               <a:avLst/>
@@ -5775,6 +5817,17 @@
                 <a:t>Application Server</a:t>
               </a:r>
             </a:p>
+            <a:p>
+              <a:pPr algn="ctr" eaLnBrk="1" hangingPunct="1"/>
+              <a:r>
+                <a:rPr lang="en-US" altLang="en-US" sz="1100" dirty="0">
+                  <a:solidFill>
+                    <a:srgbClr val="232F3E"/>
+                  </a:solidFill>
+                </a:rPr>
+                <a:t>(m4.2xlarge)</a:t>
+              </a:r>
+            </a:p>
           </p:txBody>
         </p:sp>
       </p:grpSp>
@@ -5793,7 +5846,7 @@
         <p:grpSpPr>
           <a:xfrm>
             <a:off x="8209897" y="1949601"/>
-            <a:ext cx="1292449" cy="3499729"/>
+            <a:ext cx="1410758" cy="3575710"/>
             <a:chOff x="8209897" y="1949601"/>
             <a:chExt cx="1292449" cy="3499729"/>
           </a:xfrm>
@@ -6456,7 +6509,7 @@
           <p:spPr bwMode="auto">
             <a:xfrm>
               <a:off x="5636809" y="2440074"/>
-              <a:ext cx="1427827" cy="261610"/>
+              <a:ext cx="1427827" cy="600164"/>
             </a:xfrm>
             <a:prstGeom prst="rect">
               <a:avLst/>
@@ -6588,7 +6641,7 @@
               </a:lvl9pPr>
             </a:lstStyle>
             <a:p>
-              <a:pPr algn="ctr" eaLnBrk="1" hangingPunct="1"/>
+              <a:pPr algn="ctr"/>
               <a:r>
                 <a:rPr lang="en-US" altLang="en-US" sz="1100" dirty="0">
                   <a:solidFill>
@@ -6597,6 +6650,46 @@
                 </a:rPr>
                 <a:t>Web Server</a:t>
               </a:r>
+              <a:br>
+                <a:rPr lang="en-US" altLang="en-US" sz="1100" dirty="0">
+                  <a:solidFill>
+                    <a:srgbClr val="232F3E"/>
+                  </a:solidFill>
+                </a:rPr>
+              </a:br>
+              <a:r>
+                <a:rPr lang="en-US" altLang="en-US" sz="1100" dirty="0">
+                  <a:solidFill>
+                    <a:srgbClr val="232F3E"/>
+                  </a:solidFill>
+                </a:rPr>
+                <a:t>(</a:t>
+              </a:r>
+              <a:r>
+                <a:rPr lang="en" altLang="ko-KR" sz="1100" dirty="0">
+                  <a:solidFill>
+                    <a:srgbClr val="232F3E"/>
+                  </a:solidFill>
+                </a:rPr>
+                <a:t>t3a</a:t>
+              </a:r>
+              <a:r>
+                <a:rPr lang="en" altLang="ko-KR" sz="1100" dirty="0"/>
+                <a:t>.2xlarge)</a:t>
+              </a:r>
+              <a:endParaRPr lang="en-US" altLang="en-US" sz="1100" dirty="0">
+                <a:solidFill>
+                  <a:srgbClr val="232F3E"/>
+                </a:solidFill>
+              </a:endParaRPr>
+            </a:p>
+            <a:p>
+              <a:pPr algn="ctr" eaLnBrk="1" hangingPunct="1"/>
+              <a:endParaRPr lang="en-US" altLang="en-US" sz="1100" dirty="0">
+                <a:solidFill>
+                  <a:srgbClr val="232F3E"/>
+                </a:solidFill>
+              </a:endParaRPr>
             </a:p>
           </p:txBody>
         </p:sp>
@@ -6616,8 +6709,8 @@
           </p:nvSpPr>
           <p:spPr bwMode="auto">
             <a:xfrm>
-              <a:off x="9483215" y="2488691"/>
-              <a:ext cx="1408563" cy="430887"/>
+              <a:off x="9492943" y="2303865"/>
+              <a:ext cx="1408563" cy="600164"/>
             </a:xfrm>
             <a:prstGeom prst="rect">
               <a:avLst/>
@@ -6769,6 +6862,16 @@
                   <a:cs typeface="Calibri" panose="020F0502020204030204" pitchFamily="34" charset="0"/>
                 </a:rPr>
                 <a:t>Read Replica</a:t>
+              </a:r>
+            </a:p>
+            <a:p>
+              <a:pPr algn="ctr"/>
+              <a:r>
+                <a:rPr lang="en-US" altLang="en-US" sz="1100" dirty="0">
+                  <a:ea typeface="Amazon Ember" panose="020B0603020204020204" pitchFamily="34" charset="0"/>
+                  <a:cs typeface="Calibri" panose="020F0502020204030204" pitchFamily="34" charset="0"/>
+                </a:rPr>
+                <a:t>(db.r5.4xlarge)</a:t>
               </a:r>
             </a:p>
           </p:txBody>
@@ -6802,7 +6905,7 @@
           </p:blipFill>
           <p:spPr bwMode="auto">
             <a:xfrm>
-              <a:off x="8640802" y="2117408"/>
+              <a:off x="8640802" y="1922853"/>
               <a:ext cx="379412" cy="379413"/>
             </a:xfrm>
             <a:prstGeom prst="rect">
@@ -6849,8 +6952,8 @@
           </p:nvSpPr>
           <p:spPr bwMode="auto">
             <a:xfrm>
-              <a:off x="8116787" y="2477283"/>
-              <a:ext cx="1427827" cy="261610"/>
+              <a:off x="8155698" y="2292457"/>
+              <a:ext cx="1427827" cy="430887"/>
             </a:xfrm>
             <a:prstGeom prst="rect">
               <a:avLst/>
@@ -6992,6 +7095,17 @@
                 <a:t>Application Server</a:t>
               </a:r>
             </a:p>
+            <a:p>
+              <a:pPr algn="ctr" eaLnBrk="1" hangingPunct="1"/>
+              <a:r>
+                <a:rPr lang="en-US" altLang="en-US" sz="1100" dirty="0">
+                  <a:solidFill>
+                    <a:srgbClr val="232F3E"/>
+                  </a:solidFill>
+                </a:rPr>
+                <a:t>(m4.2xlarge)</a:t>
+              </a:r>
+            </a:p>
           </p:txBody>
         </p:sp>
       </p:grpSp>
@@ -7009,7 +7123,7 @@
         </p:nvGrpSpPr>
         <p:grpSpPr>
           <a:xfrm>
-            <a:off x="7208589" y="3225401"/>
+            <a:off x="7208589" y="3254585"/>
             <a:ext cx="791893" cy="747756"/>
             <a:chOff x="5210365" y="3154572"/>
             <a:chExt cx="791893" cy="747756"/>
@@ -7302,8 +7416,8 @@
         </p:nvCxnSpPr>
         <p:spPr>
           <a:xfrm flipV="1">
-            <a:off x="6966270" y="3470320"/>
-            <a:ext cx="394628" cy="214573"/>
+            <a:off x="6984460" y="3499504"/>
+            <a:ext cx="376438" cy="224626"/>
           </a:xfrm>
           <a:prstGeom prst="bentConnector3">
             <a:avLst>
@@ -7348,9 +7462,9 @@
         <p:grpSpPr>
           <a:xfrm>
             <a:off x="5753684" y="1942405"/>
-            <a:ext cx="1212586" cy="3484975"/>
+            <a:ext cx="1230776" cy="3563450"/>
             <a:chOff x="5435412" y="1945997"/>
-            <a:chExt cx="1212586" cy="3484975"/>
+            <a:chExt cx="1230776" cy="3563450"/>
           </a:xfrm>
         </p:grpSpPr>
         <p:pic>
@@ -7492,7 +7606,7 @@
           <p:spPr>
             <a:xfrm>
               <a:off x="5447488" y="1945997"/>
-              <a:ext cx="1200510" cy="3484975"/>
+              <a:ext cx="1218700" cy="3563450"/>
             </a:xfrm>
             <a:prstGeom prst="rect">
               <a:avLst/>
@@ -7581,8 +7695,8 @@
         </p:nvCxnSpPr>
         <p:spPr>
           <a:xfrm flipH="1">
-            <a:off x="10370237" y="2305766"/>
-            <a:ext cx="8222" cy="2650777"/>
+            <a:off x="10370237" y="2208486"/>
+            <a:ext cx="8222" cy="2553503"/>
           </a:xfrm>
           <a:prstGeom prst="bentConnector3">
             <a:avLst>
@@ -7630,8 +7744,8 @@
         </p:nvCxnSpPr>
         <p:spPr>
           <a:xfrm flipV="1">
-            <a:off x="7850736" y="3464498"/>
-            <a:ext cx="371798" cy="5822"/>
+            <a:off x="7850736" y="3497387"/>
+            <a:ext cx="372955" cy="2117"/>
           </a:xfrm>
           <a:prstGeom prst="straightConnector1">
             <a:avLst/>
@@ -7677,8 +7791,8 @@
         </p:nvCxnSpPr>
         <p:spPr>
           <a:xfrm flipV="1">
-            <a:off x="9502346" y="2926513"/>
-            <a:ext cx="685151" cy="772953"/>
+            <a:off x="9620655" y="2969330"/>
+            <a:ext cx="557114" cy="768126"/>
           </a:xfrm>
           <a:prstGeom prst="bentConnector2">
             <a:avLst/>
@@ -9061,7 +9175,7 @@
         </p:blipFill>
         <p:spPr bwMode="auto">
           <a:xfrm>
-            <a:off x="9971458" y="2102265"/>
+            <a:off x="9971458" y="2004985"/>
             <a:ext cx="407001" cy="407001"/>
           </a:xfrm>
           <a:prstGeom prst="rect">
@@ -9121,7 +9235,7 @@
         </p:blipFill>
         <p:spPr bwMode="auto">
           <a:xfrm>
-            <a:off x="9963236" y="4753042"/>
+            <a:off x="9963236" y="4558488"/>
             <a:ext cx="407001" cy="407001"/>
           </a:xfrm>
           <a:prstGeom prst="rect">
@@ -9170,8 +9284,8 @@
         </p:nvCxnSpPr>
         <p:spPr>
           <a:xfrm>
-            <a:off x="9020213" y="4954506"/>
-            <a:ext cx="943023" cy="2037"/>
+            <a:off x="9020213" y="4759951"/>
+            <a:ext cx="943023" cy="2038"/>
           </a:xfrm>
           <a:prstGeom prst="straightConnector1">
             <a:avLst/>
@@ -9217,8 +9331,8 @@
         </p:nvCxnSpPr>
         <p:spPr>
           <a:xfrm flipV="1">
-            <a:off x="9020214" y="2305766"/>
-            <a:ext cx="951244" cy="1349"/>
+            <a:off x="9020214" y="2208486"/>
+            <a:ext cx="951244" cy="1350"/>
           </a:xfrm>
           <a:prstGeom prst="straightConnector1">
             <a:avLst/>
@@ -9264,8 +9378,8 @@
         </p:nvCxnSpPr>
         <p:spPr>
           <a:xfrm rot="5400000">
-            <a:off x="6023147" y="3179329"/>
-            <a:ext cx="600599" cy="5014508"/>
+            <a:off x="6034828" y="3152100"/>
+            <a:ext cx="616148" cy="5053419"/>
           </a:xfrm>
           <a:prstGeom prst="bentConnector2">
             <a:avLst/>
@@ -9311,8 +9425,8 @@
         </p:nvCxnSpPr>
         <p:spPr>
           <a:xfrm rot="5400000">
-            <a:off x="4811353" y="4432220"/>
-            <a:ext cx="559503" cy="2549823"/>
+            <a:off x="4855137" y="4466910"/>
+            <a:ext cx="481028" cy="2558918"/>
           </a:xfrm>
           <a:prstGeom prst="bentConnector2">
             <a:avLst/>

</xml_diff>